<commit_message>
Slide Sprint 2 att
</commit_message>
<xml_diff>
--- a/Apresentação/Sprint 2.pptx
+++ b/Apresentação/Sprint 2.pptx
@@ -5,20 +5,22 @@
     <p:sldMasterId id="2147483648" r:id="rId1"/>
   </p:sldMasterIdLst>
   <p:notesMasterIdLst>
-    <p:notesMasterId r:id="rId13"/>
+    <p:notesMasterId r:id="rId15"/>
   </p:notesMasterIdLst>
   <p:sldIdLst>
     <p:sldId id="256" r:id="rId2"/>
     <p:sldId id="257" r:id="rId3"/>
-    <p:sldId id="268" r:id="rId4"/>
-    <p:sldId id="269" r:id="rId5"/>
-    <p:sldId id="259" r:id="rId6"/>
-    <p:sldId id="260" r:id="rId7"/>
-    <p:sldId id="258" r:id="rId8"/>
-    <p:sldId id="264" r:id="rId9"/>
-    <p:sldId id="265" r:id="rId10"/>
-    <p:sldId id="266" r:id="rId11"/>
-    <p:sldId id="267" r:id="rId12"/>
+    <p:sldId id="270" r:id="rId4"/>
+    <p:sldId id="271" r:id="rId5"/>
+    <p:sldId id="268" r:id="rId6"/>
+    <p:sldId id="269" r:id="rId7"/>
+    <p:sldId id="259" r:id="rId8"/>
+    <p:sldId id="260" r:id="rId9"/>
+    <p:sldId id="258" r:id="rId10"/>
+    <p:sldId id="264" r:id="rId11"/>
+    <p:sldId id="265" r:id="rId12"/>
+    <p:sldId id="266" r:id="rId13"/>
+    <p:sldId id="267" r:id="rId14"/>
   </p:sldIdLst>
   <p:sldSz cx="12192000" cy="6858000"/>
   <p:notesSz cx="6858000" cy="9144000"/>
@@ -118,6 +120,67 @@
     </a:lvl9pPr>
   </p:defaultTextStyle>
   <p:extLst>
+    <p:ext uri="{521415D9-36F7-43E2-AB2F-B90AF26B5E84}">
+      <p14:sectionLst xmlns:p14="http://schemas.microsoft.com/office/powerpoint/2010/main">
+        <p14:section name="Apresentação" id="{D7ACEBAB-B7F4-4A9B-91D5-4AAAA8A66FDC}">
+          <p14:sldIdLst>
+            <p14:sldId id="256"/>
+          </p14:sldIdLst>
+        </p14:section>
+        <p14:section name="Contexto" id="{E65FBA31-81D2-4A20-9DA3-6E2057ECFAAC}">
+          <p14:sldIdLst>
+            <p14:sldId id="257"/>
+            <p14:sldId id="270"/>
+            <p14:sldId id="271"/>
+          </p14:sldIdLst>
+        </p14:section>
+        <p14:section name="Diagrama Negócio" id="{930E1065-A16D-4B77-8A2B-8E59C376A5E4}">
+          <p14:sldIdLst>
+            <p14:sldId id="268"/>
+          </p14:sldIdLst>
+        </p14:section>
+        <p14:section name="Diagrama Técnico" id="{706520F1-C624-40EA-A79D-4CF83318F00D}">
+          <p14:sldIdLst>
+            <p14:sldId id="269"/>
+          </p14:sldIdLst>
+        </p14:section>
+        <p14:section name="Backlog/Trello" id="{71B52C51-62C8-47A7-AF93-119D5B0CD510}">
+          <p14:sldIdLst>
+            <p14:sldId id="259"/>
+          </p14:sldIdLst>
+        </p14:section>
+        <p14:section name="Site" id="{119BF0ED-0E3B-49C5-8A1E-AD74EBE21D1E}">
+          <p14:sldIdLst>
+            <p14:sldId id="260"/>
+          </p14:sldIdLst>
+        </p14:section>
+        <p14:section name="Analytics" id="{BF8A1706-69B6-4068-A4B2-171ED46F4965}">
+          <p14:sldIdLst>
+            <p14:sldId id="258"/>
+          </p14:sldIdLst>
+        </p14:section>
+        <p14:section name="Sensores e Arduino" id="{C7DA6F35-F3CE-413E-8378-E23C33DB2F43}">
+          <p14:sldIdLst>
+            <p14:sldId id="264"/>
+          </p14:sldIdLst>
+        </p14:section>
+        <p14:section name="Tabelas / SQL" id="{6D4E654E-54F6-4664-A630-304FFE5ACACE}">
+          <p14:sldIdLst>
+            <p14:sldId id="265"/>
+          </p14:sldIdLst>
+        </p14:section>
+        <p14:section name="Github" id="{3BEE16DF-441B-4009-A879-62AB0B51DFC4}">
+          <p14:sldIdLst>
+            <p14:sldId id="266"/>
+          </p14:sldIdLst>
+        </p14:section>
+        <p14:section name="Resolução" id="{49A240F3-58FF-41F4-B3A5-F1968BFC97ED}">
+          <p14:sldIdLst>
+            <p14:sldId id="267"/>
+          </p14:sldIdLst>
+        </p14:section>
+      </p14:sectionLst>
+    </p:ext>
     <p:ext uri="{EFAFB233-063F-42B5-8137-9DF3F51BA10A}">
       <p15:sldGuideLst xmlns:p15="http://schemas.microsoft.com/office/powerpoint/2012/main">
         <p15:guide id="1" orient="horz" pos="2160" userDrawn="1">
@@ -218,7 +281,7 @@
           <a:p>
             <a:fld id="{2AC623DE-5237-4C19-85D3-5FFEA96937E5}" type="datetimeFigureOut">
               <a:rPr lang="pt-BR" smtClean="0"/>
-              <a:t>19/10/2021</a:t>
+              <a:t>20/10/2021</a:t>
             </a:fld>
             <a:endParaRPr lang="pt-BR"/>
           </a:p>
@@ -540,6 +603,90 @@
             <a:spLocks noGrp="1"/>
           </p:cNvSpPr>
           <p:nvPr>
+            <p:ph type="sldNum" sz="quarter" idx="10"/>
+          </p:nvPr>
+        </p:nvSpPr>
+        <p:spPr/>
+        <p:txBody>
+          <a:bodyPr/>
+          <a:lstStyle/>
+          <a:p>
+            <a:fld id="{193F2626-23AB-4752-A850-6C56816CF89C}" type="slidenum">
+              <a:rPr lang="pt-BR" smtClean="0"/>
+              <a:t>2</a:t>
+            </a:fld>
+            <a:endParaRPr lang="pt-BR"/>
+          </a:p>
+        </p:txBody>
+      </p:sp>
+    </p:spTree>
+    <p:extLst>
+      <p:ext uri="{BB962C8B-B14F-4D97-AF65-F5344CB8AC3E}">
+        <p14:creationId xmlns:p14="http://schemas.microsoft.com/office/powerpoint/2010/main" val="3831675726"/>
+      </p:ext>
+    </p:extLst>
+  </p:cSld>
+  <p:clrMapOvr>
+    <a:masterClrMapping/>
+  </p:clrMapOvr>
+</p:notes>
+</file>
+
+<file path=ppt/notesSlides/notesSlide2.xml><?xml version="1.0" encoding="utf-8"?>
+<p:notes xmlns:a="http://schemas.openxmlformats.org/drawingml/2006/main" xmlns:r="http://schemas.openxmlformats.org/officeDocument/2006/relationships" xmlns:p="http://schemas.openxmlformats.org/presentationml/2006/main">
+  <p:cSld>
+    <p:spTree>
+      <p:nvGrpSpPr>
+        <p:cNvPr id="1" name=""/>
+        <p:cNvGrpSpPr/>
+        <p:nvPr/>
+      </p:nvGrpSpPr>
+      <p:grpSpPr>
+        <a:xfrm>
+          <a:off x="0" y="0"/>
+          <a:ext cx="0" cy="0"/>
+          <a:chOff x="0" y="0"/>
+          <a:chExt cx="0" cy="0"/>
+        </a:xfrm>
+      </p:grpSpPr>
+      <p:sp>
+        <p:nvSpPr>
+          <p:cNvPr id="2" name="Espaço Reservado para Imagem de Slide 1"/>
+          <p:cNvSpPr>
+            <a:spLocks noGrp="1" noRot="1" noChangeAspect="1"/>
+          </p:cNvSpPr>
+          <p:nvPr>
+            <p:ph type="sldImg"/>
+          </p:nvPr>
+        </p:nvSpPr>
+        <p:spPr/>
+      </p:sp>
+      <p:sp>
+        <p:nvSpPr>
+          <p:cNvPr id="3" name="Espaço Reservado para Anotações 2"/>
+          <p:cNvSpPr>
+            <a:spLocks noGrp="1"/>
+          </p:cNvSpPr>
+          <p:nvPr>
+            <p:ph type="body" idx="1"/>
+          </p:nvPr>
+        </p:nvSpPr>
+        <p:spPr/>
+        <p:txBody>
+          <a:bodyPr/>
+          <a:lstStyle/>
+          <a:p>
+            <a:endParaRPr lang="pt-BR" dirty="0"/>
+          </a:p>
+        </p:txBody>
+      </p:sp>
+      <p:sp>
+        <p:nvSpPr>
+          <p:cNvPr id="4" name="Espaço Reservado para Número de Slide 3"/>
+          <p:cNvSpPr>
+            <a:spLocks noGrp="1"/>
+          </p:cNvSpPr>
+          <p:nvPr>
             <p:ph type="sldNum" sz="quarter" idx="5"/>
           </p:nvPr>
         </p:nvSpPr>
@@ -550,7 +697,7 @@
           <a:p>
             <a:fld id="{193F2626-23AB-4752-A850-6C56816CF89C}" type="slidenum">
               <a:rPr lang="pt-BR" smtClean="0"/>
-              <a:t>7</a:t>
+              <a:t>9</a:t>
             </a:fld>
             <a:endParaRPr lang="pt-BR"/>
           </a:p>
@@ -716,7 +863,7 @@
           <a:p>
             <a:fld id="{C299CD27-58EF-4BCB-B5FB-85B99416EAD9}" type="datetimeFigureOut">
               <a:rPr lang="pt-BR" smtClean="0"/>
-              <a:t>19/10/2021</a:t>
+              <a:t>20/10/2021</a:t>
             </a:fld>
             <a:endParaRPr lang="pt-BR"/>
           </a:p>
@@ -914,7 +1061,7 @@
           <a:p>
             <a:fld id="{C299CD27-58EF-4BCB-B5FB-85B99416EAD9}" type="datetimeFigureOut">
               <a:rPr lang="pt-BR" smtClean="0"/>
-              <a:t>19/10/2021</a:t>
+              <a:t>20/10/2021</a:t>
             </a:fld>
             <a:endParaRPr lang="pt-BR"/>
           </a:p>
@@ -1122,7 +1269,7 @@
           <a:p>
             <a:fld id="{C299CD27-58EF-4BCB-B5FB-85B99416EAD9}" type="datetimeFigureOut">
               <a:rPr lang="pt-BR" smtClean="0"/>
-              <a:t>19/10/2021</a:t>
+              <a:t>20/10/2021</a:t>
             </a:fld>
             <a:endParaRPr lang="pt-BR"/>
           </a:p>
@@ -1320,7 +1467,7 @@
           <a:p>
             <a:fld id="{C299CD27-58EF-4BCB-B5FB-85B99416EAD9}" type="datetimeFigureOut">
               <a:rPr lang="pt-BR" smtClean="0"/>
-              <a:t>19/10/2021</a:t>
+              <a:t>20/10/2021</a:t>
             </a:fld>
             <a:endParaRPr lang="pt-BR"/>
           </a:p>
@@ -1595,7 +1742,7 @@
           <a:p>
             <a:fld id="{C299CD27-58EF-4BCB-B5FB-85B99416EAD9}" type="datetimeFigureOut">
               <a:rPr lang="pt-BR" smtClean="0"/>
-              <a:t>19/10/2021</a:t>
+              <a:t>20/10/2021</a:t>
             </a:fld>
             <a:endParaRPr lang="pt-BR"/>
           </a:p>
@@ -1860,7 +2007,7 @@
           <a:p>
             <a:fld id="{C299CD27-58EF-4BCB-B5FB-85B99416EAD9}" type="datetimeFigureOut">
               <a:rPr lang="pt-BR" smtClean="0"/>
-              <a:t>19/10/2021</a:t>
+              <a:t>20/10/2021</a:t>
             </a:fld>
             <a:endParaRPr lang="pt-BR"/>
           </a:p>
@@ -2272,7 +2419,7 @@
           <a:p>
             <a:fld id="{C299CD27-58EF-4BCB-B5FB-85B99416EAD9}" type="datetimeFigureOut">
               <a:rPr lang="pt-BR" smtClean="0"/>
-              <a:t>19/10/2021</a:t>
+              <a:t>20/10/2021</a:t>
             </a:fld>
             <a:endParaRPr lang="pt-BR"/>
           </a:p>
@@ -2413,7 +2560,7 @@
           <a:p>
             <a:fld id="{C299CD27-58EF-4BCB-B5FB-85B99416EAD9}" type="datetimeFigureOut">
               <a:rPr lang="pt-BR" smtClean="0"/>
-              <a:t>19/10/2021</a:t>
+              <a:t>20/10/2021</a:t>
             </a:fld>
             <a:endParaRPr lang="pt-BR"/>
           </a:p>
@@ -2526,7 +2673,7 @@
           <a:p>
             <a:fld id="{C299CD27-58EF-4BCB-B5FB-85B99416EAD9}" type="datetimeFigureOut">
               <a:rPr lang="pt-BR" smtClean="0"/>
-              <a:t>19/10/2021</a:t>
+              <a:t>20/10/2021</a:t>
             </a:fld>
             <a:endParaRPr lang="pt-BR"/>
           </a:p>
@@ -2837,7 +2984,7 @@
           <a:p>
             <a:fld id="{C299CD27-58EF-4BCB-B5FB-85B99416EAD9}" type="datetimeFigureOut">
               <a:rPr lang="pt-BR" smtClean="0"/>
-              <a:t>19/10/2021</a:t>
+              <a:t>20/10/2021</a:t>
             </a:fld>
             <a:endParaRPr lang="pt-BR"/>
           </a:p>
@@ -3125,7 +3272,7 @@
           <a:p>
             <a:fld id="{C299CD27-58EF-4BCB-B5FB-85B99416EAD9}" type="datetimeFigureOut">
               <a:rPr lang="pt-BR" smtClean="0"/>
-              <a:t>19/10/2021</a:t>
+              <a:t>20/10/2021</a:t>
             </a:fld>
             <a:endParaRPr lang="pt-BR"/>
           </a:p>
@@ -3203,9 +3350,15 @@
   <p:cSld>
     <p:bg>
       <p:bgPr>
-        <a:solidFill>
-          <a:srgbClr val="FFFFFF"/>
-        </a:solidFill>
+        <a:blipFill dpi="0" rotWithShape="1">
+          <a:blip r:embed="rId13">
+            <a:lum/>
+          </a:blip>
+          <a:srcRect/>
+          <a:stretch>
+            <a:fillRect/>
+          </a:stretch>
+        </a:blipFill>
         <a:effectLst/>
       </p:bgPr>
     </p:bg>
@@ -3369,7 +3522,7 @@
           <a:p>
             <a:fld id="{C299CD27-58EF-4BCB-B5FB-85B99416EAD9}" type="datetimeFigureOut">
               <a:rPr lang="pt-BR" smtClean="0"/>
-              <a:t>19/10/2021</a:t>
+              <a:t>20/10/2021</a:t>
             </a:fld>
             <a:endParaRPr lang="pt-BR"/>
           </a:p>
@@ -3772,6 +3925,14 @@
 <file path=ppt/slides/slide1.xml><?xml version="1.0" encoding="utf-8"?>
 <p:sld xmlns:a="http://schemas.openxmlformats.org/drawingml/2006/main" xmlns:r="http://schemas.openxmlformats.org/officeDocument/2006/relationships" xmlns:p="http://schemas.openxmlformats.org/presentationml/2006/main">
   <p:cSld>
+    <p:bg>
+      <p:bgPr>
+        <a:solidFill>
+          <a:srgbClr val="FFFFFF"/>
+        </a:solidFill>
+        <a:effectLst/>
+      </p:bgPr>
+    </p:bg>
     <p:spTree>
       <p:nvGrpSpPr>
         <p:cNvPr id="1" name=""/>
@@ -3866,8 +4027,8 @@
         </p:nvSpPr>
         <p:spPr>
           <a:xfrm>
-            <a:off x="1886857" y="4044380"/>
-            <a:ext cx="2989944" cy="2121299"/>
+            <a:off x="1886856" y="4044380"/>
+            <a:ext cx="3142343" cy="2107038"/>
           </a:xfrm>
           <a:prstGeom prst="rect">
             <a:avLst/>
@@ -4213,12 +4374,461 @@
   <p:clrMapOvr>
     <a:masterClrMapping/>
   </p:clrMapOvr>
+  <p:timing>
+    <p:tnLst>
+      <p:par>
+        <p:cTn id="1" dur="indefinite" restart="never" nodeType="tmRoot"/>
+      </p:par>
+    </p:tnLst>
+  </p:timing>
 </p:sld>
 </file>
 
 <file path=ppt/slides/slide10.xml><?xml version="1.0" encoding="utf-8"?>
 <p:sld xmlns:a="http://schemas.openxmlformats.org/drawingml/2006/main" xmlns:r="http://schemas.openxmlformats.org/officeDocument/2006/relationships" xmlns:p="http://schemas.openxmlformats.org/presentationml/2006/main">
   <p:cSld>
+    <p:spTree>
+      <p:nvGrpSpPr>
+        <p:cNvPr id="1" name=""/>
+        <p:cNvGrpSpPr/>
+        <p:nvPr/>
+      </p:nvGrpSpPr>
+      <p:grpSpPr>
+        <a:xfrm>
+          <a:off x="0" y="0"/>
+          <a:ext cx="0" cy="0"/>
+          <a:chOff x="0" y="0"/>
+          <a:chExt cx="0" cy="0"/>
+        </a:xfrm>
+      </p:grpSpPr>
+      <p:sp>
+        <p:nvSpPr>
+          <p:cNvPr id="5" name="Título 1">
+            <a:extLst>
+              <a:ext uri="{FF2B5EF4-FFF2-40B4-BE49-F238E27FC236}">
+                <a16:creationId xmlns:a16="http://schemas.microsoft.com/office/drawing/2014/main" id="{8A0AA669-0469-465D-815F-87FEEED0039A}"/>
+              </a:ext>
+            </a:extLst>
+          </p:cNvPr>
+          <p:cNvSpPr txBox="1">
+            <a:spLocks/>
+          </p:cNvSpPr>
+          <p:nvPr/>
+        </p:nvSpPr>
+        <p:spPr>
+          <a:xfrm>
+            <a:off x="3304309" y="302230"/>
+            <a:ext cx="5839692" cy="609601"/>
+          </a:xfrm>
+          <a:prstGeom prst="rect">
+            <a:avLst/>
+          </a:prstGeom>
+          <a:noFill/>
+          <a:ln w="57150">
+            <a:solidFill>
+              <a:srgbClr val="E57019"/>
+            </a:solidFill>
+            <a:prstDash val="lgDash"/>
+          </a:ln>
+        </p:spPr>
+        <p:txBody>
+          <a:bodyPr vert="horz" lIns="91440" tIns="45720" rIns="91440" bIns="45720" rtlCol="0" anchor="ctr">
+            <a:normAutofit fontScale="97500"/>
+          </a:bodyPr>
+          <a:lstStyle>
+            <a:lvl1pPr algn="l" defTabSz="914400" rtl="0" eaLnBrk="1" latinLnBrk="0" hangingPunct="1">
+              <a:lnSpc>
+                <a:spcPct val="90000"/>
+              </a:lnSpc>
+              <a:spcBef>
+                <a:spcPct val="0"/>
+              </a:spcBef>
+              <a:buNone/>
+              <a:defRPr sz="4400" kern="1200">
+                <a:solidFill>
+                  <a:schemeClr val="tx1"/>
+                </a:solidFill>
+                <a:latin typeface="+mj-lt"/>
+                <a:ea typeface="+mj-ea"/>
+                <a:cs typeface="+mj-cs"/>
+              </a:defRPr>
+            </a:lvl1pPr>
+          </a:lstStyle>
+          <a:p>
+            <a:pPr algn="ctr"/>
+            <a:r>
+              <a:rPr lang="pt-BR" sz="2400" dirty="0">
+                <a:latin typeface="Bahnschrift" panose="020B0502040204020203" pitchFamily="34" charset="0"/>
+              </a:rPr>
+              <a:t>Demonstração do Simulador de Sensores</a:t>
+            </a:r>
+          </a:p>
+        </p:txBody>
+      </p:sp>
+      <p:pic>
+        <p:nvPicPr>
+          <p:cNvPr id="4" name="Imagem 3">
+            <a:extLst>
+              <a:ext uri="{FF2B5EF4-FFF2-40B4-BE49-F238E27FC236}">
+                <a16:creationId xmlns:a16="http://schemas.microsoft.com/office/drawing/2014/main" id="{8810BCA7-9A63-408C-A773-F731EE6F2E5A}"/>
+              </a:ext>
+            </a:extLst>
+          </p:cNvPr>
+          <p:cNvPicPr>
+            <a:picLocks noChangeAspect="1"/>
+          </p:cNvPicPr>
+          <p:nvPr/>
+        </p:nvPicPr>
+        <p:blipFill>
+          <a:blip r:embed="rId2">
+            <a:extLst>
+              <a:ext uri="{BEBA8EAE-BF5A-486C-A8C5-ECC9F3942E4B}">
+                <a14:imgProps xmlns:a14="http://schemas.microsoft.com/office/drawing/2010/main">
+                  <a14:imgLayer r:embed="rId3">
+                    <a14:imgEffect>
+                      <a14:backgroundRemoval t="10000" b="90000" l="10000" r="90000">
+                        <a14:foregroundMark x1="59434" y1="82390" x2="59434" y2="82390"/>
+                        <a14:foregroundMark x1="65409" y1="75472" x2="65409" y2="75472"/>
+                        <a14:foregroundMark x1="79245" y1="77358" x2="79245" y2="77358"/>
+                        <a14:foregroundMark x1="61006" y1="34591" x2="61006" y2="34591"/>
+                        <a14:foregroundMark x1="38050" y1="35220" x2="38050" y2="35220"/>
+                        <a14:foregroundMark x1="47170" y1="73585" x2="47170" y2="73585"/>
+                        <a14:foregroundMark x1="44340" y1="77358" x2="44340" y2="77358"/>
+                        <a14:foregroundMark x1="32704" y1="77358" x2="32704" y2="77358"/>
+                        <a14:foregroundMark x1="26101" y1="80503" x2="26101" y2="80503"/>
+                      </a14:backgroundRemoval>
+                    </a14:imgEffect>
+                    <a14:imgEffect>
+                      <a14:sharpenSoften amount="25000"/>
+                    </a14:imgEffect>
+                  </a14:imgLayer>
+                </a14:imgProps>
+              </a:ext>
+              <a:ext uri="{28A0092B-C50C-407E-A947-70E740481C1C}">
+                <a14:useLocalDpi xmlns:a14="http://schemas.microsoft.com/office/drawing/2010/main" val="0"/>
+              </a:ext>
+            </a:extLst>
+          </a:blip>
+          <a:stretch>
+            <a:fillRect/>
+          </a:stretch>
+        </p:blipFill>
+        <p:spPr>
+          <a:xfrm>
+            <a:off x="619124" y="2391796"/>
+            <a:ext cx="4148816" cy="2074408"/>
+          </a:xfrm>
+          <a:prstGeom prst="rect">
+            <a:avLst/>
+          </a:prstGeom>
+        </p:spPr>
+      </p:pic>
+      <p:pic>
+        <p:nvPicPr>
+          <p:cNvPr id="1028" name="Picture 4" descr="Node.js - O que é, como funciona e quais as vantagens | OPUS">
+            <a:extLst>
+              <a:ext uri="{FF2B5EF4-FFF2-40B4-BE49-F238E27FC236}">
+                <a16:creationId xmlns:a16="http://schemas.microsoft.com/office/drawing/2014/main" id="{F7EF85FB-FC46-4D91-9A0B-52EFC04A42AE}"/>
+              </a:ext>
+            </a:extLst>
+          </p:cNvPr>
+          <p:cNvPicPr>
+            <a:picLocks noChangeAspect="1" noChangeArrowheads="1"/>
+          </p:cNvPicPr>
+          <p:nvPr/>
+        </p:nvPicPr>
+        <p:blipFill>
+          <a:blip r:embed="rId4">
+            <a:extLst>
+              <a:ext uri="{BEBA8EAE-BF5A-486C-A8C5-ECC9F3942E4B}">
+                <a14:imgProps xmlns:a14="http://schemas.microsoft.com/office/drawing/2010/main">
+                  <a14:imgLayer r:embed="rId5">
+                    <a14:imgEffect>
+                      <a14:backgroundRemoval t="10000" b="90000" l="10000" r="90000">
+                        <a14:foregroundMark x1="20700" y1="35667" x2="20700" y2="35667"/>
+                        <a14:foregroundMark x1="33200" y1="38500" x2="33200" y2="38500"/>
+                        <a14:foregroundMark x1="37700" y1="43000" x2="37700" y2="43000"/>
+                        <a14:foregroundMark x1="40700" y1="42500" x2="40700" y2="42500"/>
+                        <a14:foregroundMark x1="40700" y1="42500" x2="40700" y2="42500"/>
+                        <a14:foregroundMark x1="40400" y1="42000" x2="40400" y2="42000"/>
+                        <a14:foregroundMark x1="42700" y1="51000" x2="42700" y2="51000"/>
+                        <a14:foregroundMark x1="42700" y1="51000" x2="42700" y2="51000"/>
+                        <a14:foregroundMark x1="47100" y1="47667" x2="47100" y2="47667"/>
+                        <a14:foregroundMark x1="47100" y1="47000" x2="47100" y2="47000"/>
+                        <a14:foregroundMark x1="33900" y1="54333" x2="33900" y2="54333"/>
+                        <a14:foregroundMark x1="33900" y1="54333" x2="33900" y2="54333"/>
+                        <a14:foregroundMark x1="66500" y1="33500" x2="66500" y2="33500"/>
+                        <a14:foregroundMark x1="66500" y1="36333" x2="66500" y2="36333"/>
+                        <a14:foregroundMark x1="67100" y1="42000" x2="67100" y2="42000"/>
+                        <a14:foregroundMark x1="67100" y1="42500" x2="67100" y2="42500"/>
+                        <a14:foregroundMark x1="67100" y1="40833" x2="67100" y2="40833"/>
+                        <a14:foregroundMark x1="67100" y1="40833" x2="67100" y2="40833"/>
+                        <a14:foregroundMark x1="66800" y1="40333" x2="66800" y2="40333"/>
+                        <a14:foregroundMark x1="75300" y1="45333" x2="75300" y2="45333"/>
+                        <a14:foregroundMark x1="75300" y1="45333" x2="75300" y2="45333"/>
+                        <a14:foregroundMark x1="81000" y1="44167" x2="81000" y2="44167"/>
+                        <a14:foregroundMark x1="54400" y1="63333" x2="54400" y2="63333"/>
+                        <a14:foregroundMark x1="50400" y1="69500" x2="50400" y2="69500"/>
+                      </a14:backgroundRemoval>
+                    </a14:imgEffect>
+                  </a14:imgLayer>
+                </a14:imgProps>
+              </a:ext>
+              <a:ext uri="{28A0092B-C50C-407E-A947-70E740481C1C}">
+                <a14:useLocalDpi xmlns:a14="http://schemas.microsoft.com/office/drawing/2010/main" val="0"/>
+              </a:ext>
+            </a:extLst>
+          </a:blip>
+          <a:srcRect/>
+          <a:stretch>
+            <a:fillRect/>
+          </a:stretch>
+        </p:blipFill>
+        <p:spPr bwMode="auto">
+          <a:xfrm>
+            <a:off x="6585857" y="2283641"/>
+            <a:ext cx="4283529" cy="2570117"/>
+          </a:xfrm>
+          <a:prstGeom prst="rect">
+            <a:avLst/>
+          </a:prstGeom>
+          <a:noFill/>
+          <a:extLst>
+            <a:ext uri="{909E8E84-426E-40DD-AFC4-6F175D3DCCD1}">
+              <a14:hiddenFill xmlns:a14="http://schemas.microsoft.com/office/drawing/2010/main">
+                <a:solidFill>
+                  <a:srgbClr val="FFFFFF"/>
+                </a:solidFill>
+              </a14:hiddenFill>
+            </a:ext>
+          </a:extLst>
+        </p:spPr>
+      </p:pic>
+    </p:spTree>
+    <p:extLst>
+      <p:ext uri="{BB962C8B-B14F-4D97-AF65-F5344CB8AC3E}">
+        <p14:creationId xmlns:p14="http://schemas.microsoft.com/office/powerpoint/2010/main" val="3792423416"/>
+      </p:ext>
+    </p:extLst>
+  </p:cSld>
+  <p:clrMapOvr>
+    <a:masterClrMapping/>
+  </p:clrMapOvr>
+  <p:timing>
+    <p:tnLst>
+      <p:par>
+        <p:cTn id="1" dur="indefinite" restart="never" nodeType="tmRoot"/>
+      </p:par>
+    </p:tnLst>
+  </p:timing>
+</p:sld>
+</file>
+
+<file path=ppt/slides/slide11.xml><?xml version="1.0" encoding="utf-8"?>
+<p:sld xmlns:a="http://schemas.openxmlformats.org/drawingml/2006/main" xmlns:r="http://schemas.openxmlformats.org/officeDocument/2006/relationships" xmlns:p="http://schemas.openxmlformats.org/presentationml/2006/main">
+  <p:cSld>
+    <p:spTree>
+      <p:nvGrpSpPr>
+        <p:cNvPr id="1" name=""/>
+        <p:cNvGrpSpPr/>
+        <p:nvPr/>
+      </p:nvGrpSpPr>
+      <p:grpSpPr>
+        <a:xfrm>
+          <a:off x="0" y="0"/>
+          <a:ext cx="0" cy="0"/>
+          <a:chOff x="0" y="0"/>
+          <a:chExt cx="0" cy="0"/>
+        </a:xfrm>
+      </p:grpSpPr>
+      <p:sp>
+        <p:nvSpPr>
+          <p:cNvPr id="5" name="Título 1">
+            <a:extLst>
+              <a:ext uri="{FF2B5EF4-FFF2-40B4-BE49-F238E27FC236}">
+                <a16:creationId xmlns:a16="http://schemas.microsoft.com/office/drawing/2014/main" id="{8A0AA669-0469-465D-815F-87FEEED0039A}"/>
+              </a:ext>
+            </a:extLst>
+          </p:cNvPr>
+          <p:cNvSpPr txBox="1">
+            <a:spLocks/>
+          </p:cNvSpPr>
+          <p:nvPr/>
+        </p:nvSpPr>
+        <p:spPr>
+          <a:xfrm>
+            <a:off x="3560618" y="178405"/>
+            <a:ext cx="5070764" cy="609601"/>
+          </a:xfrm>
+          <a:prstGeom prst="rect">
+            <a:avLst/>
+          </a:prstGeom>
+          <a:noFill/>
+          <a:ln w="57150">
+            <a:solidFill>
+              <a:srgbClr val="E57019"/>
+            </a:solidFill>
+            <a:prstDash val="lgDash"/>
+          </a:ln>
+        </p:spPr>
+        <p:txBody>
+          <a:bodyPr vert="horz" lIns="91440" tIns="45720" rIns="91440" bIns="45720" rtlCol="0" anchor="ctr">
+            <a:normAutofit fontScale="97500"/>
+          </a:bodyPr>
+          <a:lstStyle>
+            <a:lvl1pPr algn="l" defTabSz="914400" rtl="0" eaLnBrk="1" latinLnBrk="0" hangingPunct="1">
+              <a:lnSpc>
+                <a:spcPct val="90000"/>
+              </a:lnSpc>
+              <a:spcBef>
+                <a:spcPct val="0"/>
+              </a:spcBef>
+              <a:buNone/>
+              <a:defRPr sz="4400" kern="1200">
+                <a:solidFill>
+                  <a:schemeClr val="tx1"/>
+                </a:solidFill>
+                <a:latin typeface="+mj-lt"/>
+                <a:ea typeface="+mj-ea"/>
+                <a:cs typeface="+mj-cs"/>
+              </a:defRPr>
+            </a:lvl1pPr>
+          </a:lstStyle>
+          <a:p>
+            <a:pPr algn="ctr"/>
+            <a:r>
+              <a:rPr lang="pt-BR" sz="2400" dirty="0">
+                <a:latin typeface="Bahnschrift" panose="020B0502040204020203" pitchFamily="34" charset="0"/>
+              </a:rPr>
+              <a:t>Tabelas / Modelo de dados Lógico</a:t>
+            </a:r>
+          </a:p>
+        </p:txBody>
+      </p:sp>
+      <p:pic>
+        <p:nvPicPr>
+          <p:cNvPr id="3" name="Imagem 2">
+            <a:extLst>
+              <a:ext uri="{FF2B5EF4-FFF2-40B4-BE49-F238E27FC236}">
+                <a16:creationId xmlns:a16="http://schemas.microsoft.com/office/drawing/2014/main" id="{453D1DE1-5E6A-4701-815A-F9B48AA49864}"/>
+              </a:ext>
+            </a:extLst>
+          </p:cNvPr>
+          <p:cNvPicPr>
+            <a:picLocks noChangeAspect="1"/>
+          </p:cNvPicPr>
+          <p:nvPr/>
+        </p:nvPicPr>
+        <p:blipFill>
+          <a:blip r:embed="rId2"/>
+          <a:stretch>
+            <a:fillRect/>
+          </a:stretch>
+        </p:blipFill>
+        <p:spPr>
+          <a:xfrm>
+            <a:off x="581025" y="1051225"/>
+            <a:ext cx="6648450" cy="5362575"/>
+          </a:xfrm>
+          <a:prstGeom prst="rect">
+            <a:avLst/>
+          </a:prstGeom>
+          <a:ln>
+            <a:noFill/>
+          </a:ln>
+          <a:effectLst>
+            <a:outerShdw blurRad="292100" dist="139700" dir="2700000" algn="tl" rotWithShape="0">
+              <a:srgbClr val="333333">
+                <a:alpha val="65000"/>
+              </a:srgbClr>
+            </a:outerShdw>
+          </a:effectLst>
+        </p:spPr>
+      </p:pic>
+      <p:pic>
+        <p:nvPicPr>
+          <p:cNvPr id="2050" name="Picture 2" descr="MySQL 8: as melhorias da nova versão do MySQL | Homehost">
+            <a:extLst>
+              <a:ext uri="{FF2B5EF4-FFF2-40B4-BE49-F238E27FC236}">
+                <a16:creationId xmlns:a16="http://schemas.microsoft.com/office/drawing/2014/main" id="{4AA54AEF-3C3E-457C-9C7D-5EDD55675372}"/>
+              </a:ext>
+            </a:extLst>
+          </p:cNvPr>
+          <p:cNvPicPr>
+            <a:picLocks noChangeAspect="1" noChangeArrowheads="1"/>
+          </p:cNvPicPr>
+          <p:nvPr/>
+        </p:nvPicPr>
+        <p:blipFill>
+          <a:blip r:embed="rId3">
+            <a:extLst>
+              <a:ext uri="{28A0092B-C50C-407E-A947-70E740481C1C}">
+                <a14:useLocalDpi xmlns:a14="http://schemas.microsoft.com/office/drawing/2010/main" val="0"/>
+              </a:ext>
+            </a:extLst>
+          </a:blip>
+          <a:srcRect/>
+          <a:stretch>
+            <a:fillRect/>
+          </a:stretch>
+        </p:blipFill>
+        <p:spPr bwMode="auto">
+          <a:xfrm>
+            <a:off x="8029575" y="2561629"/>
+            <a:ext cx="3257140" cy="1361383"/>
+          </a:xfrm>
+          <a:prstGeom prst="rect">
+            <a:avLst/>
+          </a:prstGeom>
+          <a:noFill/>
+          <a:extLst>
+            <a:ext uri="{909E8E84-426E-40DD-AFC4-6F175D3DCCD1}">
+              <a14:hiddenFill xmlns:a14="http://schemas.microsoft.com/office/drawing/2010/main">
+                <a:solidFill>
+                  <a:srgbClr val="FFFFFF"/>
+                </a:solidFill>
+              </a14:hiddenFill>
+            </a:ext>
+          </a:extLst>
+        </p:spPr>
+      </p:pic>
+    </p:spTree>
+    <p:extLst>
+      <p:ext uri="{BB962C8B-B14F-4D97-AF65-F5344CB8AC3E}">
+        <p14:creationId xmlns:p14="http://schemas.microsoft.com/office/powerpoint/2010/main" val="1542098227"/>
+      </p:ext>
+    </p:extLst>
+  </p:cSld>
+  <p:clrMapOvr>
+    <a:masterClrMapping/>
+  </p:clrMapOvr>
+  <p:timing>
+    <p:tnLst>
+      <p:par>
+        <p:cTn id="1" dur="indefinite" restart="never" nodeType="tmRoot"/>
+      </p:par>
+    </p:tnLst>
+  </p:timing>
+</p:sld>
+</file>
+
+<file path=ppt/slides/slide12.xml><?xml version="1.0" encoding="utf-8"?>
+<p:sld xmlns:a="http://schemas.openxmlformats.org/drawingml/2006/main" xmlns:r="http://schemas.openxmlformats.org/officeDocument/2006/relationships" xmlns:p="http://schemas.openxmlformats.org/presentationml/2006/main">
+  <p:cSld>
+    <p:bg>
+      <p:bgPr>
+        <a:blipFill dpi="0" rotWithShape="1">
+          <a:blip r:embed="rId2">
+            <a:lum/>
+          </a:blip>
+          <a:srcRect/>
+          <a:stretch>
+            <a:fillRect/>
+          </a:stretch>
+        </a:blipFill>
+        <a:effectLst/>
+      </p:bgPr>
+    </p:bg>
     <p:spTree>
       <p:nvGrpSpPr>
         <p:cNvPr id="1" name=""/>
@@ -4265,7 +4875,7 @@
         </p:spPr>
         <p:txBody>
           <a:bodyPr vert="horz" lIns="91440" tIns="45720" rIns="91440" bIns="45720" rtlCol="0" anchor="ctr">
-            <a:normAutofit fontScale="90000"/>
+            <a:normAutofit fontScale="97500"/>
           </a:bodyPr>
           <a:lstStyle>
             <a:lvl1pPr algn="l" defTabSz="914400" rtl="0" eaLnBrk="1" latinLnBrk="0" hangingPunct="1">
@@ -4312,7 +4922,7 @@
           <p:nvPr/>
         </p:nvPicPr>
         <p:blipFill rotWithShape="1">
-          <a:blip r:embed="rId2"/>
+          <a:blip r:embed="rId3"/>
           <a:srcRect t="11964"/>
           <a:stretch/>
         </p:blipFill>
@@ -4348,10 +4958,17 @@
   <p:clrMapOvr>
     <a:masterClrMapping/>
   </p:clrMapOvr>
+  <p:timing>
+    <p:tnLst>
+      <p:par>
+        <p:cTn id="1" dur="indefinite" restart="never" nodeType="tmRoot"/>
+      </p:par>
+    </p:tnLst>
+  </p:timing>
 </p:sld>
 </file>
 
-<file path=ppt/slides/slide11.xml><?xml version="1.0" encoding="utf-8"?>
+<file path=ppt/slides/slide13.xml><?xml version="1.0" encoding="utf-8"?>
 <p:sld xmlns:a="http://schemas.openxmlformats.org/drawingml/2006/main" xmlns:r="http://schemas.openxmlformats.org/officeDocument/2006/relationships" xmlns:p="http://schemas.openxmlformats.org/presentationml/2006/main">
   <p:cSld>
     <p:spTree>
@@ -4370,7 +4987,7 @@
       </p:grpSpPr>
       <p:sp>
         <p:nvSpPr>
-          <p:cNvPr id="5" name="Título 1">
+          <p:cNvPr id="6" name="Título 1">
             <a:extLst>
               <a:ext uri="{FF2B5EF4-FFF2-40B4-BE49-F238E27FC236}">
                 <a16:creationId xmlns:a16="http://schemas.microsoft.com/office/drawing/2014/main" id="{8A0AA669-0469-465D-815F-87FEEED0039A}"/>
@@ -4384,8 +5001,8 @@
         </p:nvSpPr>
         <p:spPr>
           <a:xfrm>
-            <a:off x="4409209" y="449215"/>
-            <a:ext cx="3373582" cy="609601"/>
+            <a:off x="3560618" y="178405"/>
+            <a:ext cx="5070764" cy="609601"/>
           </a:xfrm>
           <a:prstGeom prst="rect">
             <a:avLst/>
@@ -4424,11 +5041,14 @@
           <a:p>
             <a:pPr algn="ctr"/>
             <a:r>
-              <a:rPr lang="pt-BR" sz="2400" dirty="0">
+              <a:rPr lang="pt-BR" sz="2400" dirty="0" smtClean="0">
                 <a:latin typeface="Bahnschrift" panose="020B0502040204020203" pitchFamily="34" charset="0"/>
               </a:rPr>
               <a:t>Resolução</a:t>
             </a:r>
+            <a:endParaRPr lang="pt-BR" sz="2400" dirty="0">
+              <a:latin typeface="Bahnschrift" panose="020B0502040204020203" pitchFamily="34" charset="0"/>
+            </a:endParaRPr>
           </a:p>
         </p:txBody>
       </p:sp>
@@ -4442,6 +5062,13 @@
   <p:clrMapOvr>
     <a:masterClrMapping/>
   </p:clrMapOvr>
+  <p:timing>
+    <p:tnLst>
+      <p:par>
+        <p:cTn id="1" dur="indefinite" restart="never" nodeType="tmRoot"/>
+      </p:par>
+    </p:tnLst>
+  </p:timing>
 </p:sld>
 </file>
 
@@ -4526,6 +5153,113 @@
           </a:p>
         </p:txBody>
       </p:sp>
+      <p:sp>
+        <p:nvSpPr>
+          <p:cNvPr id="2" name="CaixaDeTexto 1"/>
+          <p:cNvSpPr txBox="1"/>
+          <p:nvPr/>
+        </p:nvSpPr>
+        <p:spPr>
+          <a:xfrm>
+            <a:off x="723076" y="1971620"/>
+            <a:ext cx="4966524" cy="369332"/>
+          </a:xfrm>
+          <a:prstGeom prst="rect">
+            <a:avLst/>
+          </a:prstGeom>
+          <a:noFill/>
+        </p:spPr>
+        <p:txBody>
+          <a:bodyPr wrap="square" rtlCol="0">
+            <a:spAutoFit/>
+          </a:bodyPr>
+          <a:lstStyle/>
+          <a:p>
+            <a:pPr marL="285750" indent="-285750">
+              <a:buBlip>
+                <a:blip r:embed="rId3"/>
+              </a:buBlip>
+            </a:pPr>
+            <a:r>
+              <a:rPr lang="pt-BR" dirty="0" smtClean="0"/>
+              <a:t>Como funciona transporte público no Brasil?</a:t>
+            </a:r>
+          </a:p>
+        </p:txBody>
+      </p:sp>
+      <p:sp>
+        <p:nvSpPr>
+          <p:cNvPr id="3" name="CaixaDeTexto 2"/>
+          <p:cNvSpPr txBox="1"/>
+          <p:nvPr/>
+        </p:nvSpPr>
+        <p:spPr>
+          <a:xfrm>
+            <a:off x="723076" y="2340952"/>
+            <a:ext cx="4197268" cy="646331"/>
+          </a:xfrm>
+          <a:prstGeom prst="rect">
+            <a:avLst/>
+          </a:prstGeom>
+          <a:noFill/>
+        </p:spPr>
+        <p:txBody>
+          <a:bodyPr wrap="square" rtlCol="0">
+            <a:spAutoFit/>
+          </a:bodyPr>
+          <a:lstStyle/>
+          <a:p>
+            <a:pPr marL="285750" indent="-285750">
+              <a:buBlip>
+                <a:blip r:embed="rId3"/>
+              </a:buBlip>
+            </a:pPr>
+            <a:r>
+              <a:rPr lang="pt-BR" dirty="0"/>
+              <a:t>Como a gente resolve os problemas estes problemas?</a:t>
+            </a:r>
+          </a:p>
+        </p:txBody>
+      </p:sp>
+      <p:sp>
+        <p:nvSpPr>
+          <p:cNvPr id="4" name="CaixaDeTexto 3"/>
+          <p:cNvSpPr txBox="1"/>
+          <p:nvPr/>
+        </p:nvSpPr>
+        <p:spPr>
+          <a:xfrm>
+            <a:off x="723076" y="2987283"/>
+            <a:ext cx="3829895" cy="369332"/>
+          </a:xfrm>
+          <a:prstGeom prst="rect">
+            <a:avLst/>
+          </a:prstGeom>
+          <a:noFill/>
+        </p:spPr>
+        <p:txBody>
+          <a:bodyPr wrap="none" rtlCol="0">
+            <a:spAutoFit/>
+          </a:bodyPr>
+          <a:lstStyle/>
+          <a:p>
+            <a:pPr marL="285750" indent="-285750">
+              <a:buBlip>
+                <a:blip r:embed="rId3"/>
+              </a:buBlip>
+            </a:pPr>
+            <a:r>
+              <a:rPr lang="pt-BR" dirty="0"/>
+              <a:t>Como funciona o sensor no ônibus</a:t>
+            </a:r>
+            <a:r>
+              <a:rPr lang="pt-BR" dirty="0" smtClean="0"/>
+              <a:t>?</a:t>
+            </a:r>
+            <a:endParaRPr lang="pt-BR" dirty="0"/>
+          </a:p>
+        </p:txBody>
+      </p:sp>
     </p:spTree>
     <p:extLst>
       <p:ext uri="{BB962C8B-B14F-4D97-AF65-F5344CB8AC3E}">
@@ -4536,12 +5270,376 @@
   <p:clrMapOvr>
     <a:masterClrMapping/>
   </p:clrMapOvr>
+  <p:timing>
+    <p:tnLst>
+      <p:par>
+        <p:cTn id="1" dur="indefinite" restart="never" nodeType="tmRoot"/>
+      </p:par>
+    </p:tnLst>
+  </p:timing>
 </p:sld>
 </file>
 
 <file path=ppt/slides/slide3.xml><?xml version="1.0" encoding="utf-8"?>
 <p:sld xmlns:a="http://schemas.openxmlformats.org/drawingml/2006/main" xmlns:r="http://schemas.openxmlformats.org/officeDocument/2006/relationships" xmlns:p="http://schemas.openxmlformats.org/presentationml/2006/main">
   <p:cSld>
+    <p:spTree>
+      <p:nvGrpSpPr>
+        <p:cNvPr id="1" name=""/>
+        <p:cNvGrpSpPr/>
+        <p:nvPr/>
+      </p:nvGrpSpPr>
+      <p:grpSpPr>
+        <a:xfrm>
+          <a:off x="0" y="0"/>
+          <a:ext cx="0" cy="0"/>
+          <a:chOff x="0" y="0"/>
+          <a:chExt cx="0" cy="0"/>
+        </a:xfrm>
+      </p:grpSpPr>
+      <p:sp>
+        <p:nvSpPr>
+          <p:cNvPr id="5" name="Título 1">
+            <a:extLst>
+              <a:ext uri="{FF2B5EF4-FFF2-40B4-BE49-F238E27FC236}">
+                <a16:creationId xmlns:a16="http://schemas.microsoft.com/office/drawing/2014/main" id="{8A0AA669-0469-465D-815F-87FEEED0039A}"/>
+              </a:ext>
+            </a:extLst>
+          </p:cNvPr>
+          <p:cNvSpPr txBox="1">
+            <a:spLocks/>
+          </p:cNvSpPr>
+          <p:nvPr/>
+        </p:nvSpPr>
+        <p:spPr>
+          <a:xfrm>
+            <a:off x="3560618" y="393715"/>
+            <a:ext cx="5070764" cy="609601"/>
+          </a:xfrm>
+          <a:prstGeom prst="rect">
+            <a:avLst/>
+          </a:prstGeom>
+          <a:noFill/>
+          <a:ln w="57150">
+            <a:solidFill>
+              <a:srgbClr val="E57019"/>
+            </a:solidFill>
+            <a:prstDash val="lgDash"/>
+          </a:ln>
+        </p:spPr>
+        <p:txBody>
+          <a:bodyPr vert="horz" lIns="91440" tIns="45720" rIns="91440" bIns="45720" rtlCol="0" anchor="ctr">
+            <a:normAutofit fontScale="97500"/>
+          </a:bodyPr>
+          <a:lstStyle>
+            <a:lvl1pPr algn="l" defTabSz="914400" rtl="0" eaLnBrk="1" latinLnBrk="0" hangingPunct="1">
+              <a:lnSpc>
+                <a:spcPct val="90000"/>
+              </a:lnSpc>
+              <a:spcBef>
+                <a:spcPct val="0"/>
+              </a:spcBef>
+              <a:buNone/>
+              <a:defRPr sz="4400" kern="1200">
+                <a:solidFill>
+                  <a:schemeClr val="tx1"/>
+                </a:solidFill>
+                <a:latin typeface="+mj-lt"/>
+                <a:ea typeface="+mj-ea"/>
+                <a:cs typeface="+mj-cs"/>
+              </a:defRPr>
+            </a:lvl1pPr>
+          </a:lstStyle>
+          <a:p>
+            <a:pPr algn="ctr"/>
+            <a:r>
+              <a:rPr lang="pt-BR" sz="2400" dirty="0">
+                <a:latin typeface="Bahnschrift" panose="020B0502040204020203" pitchFamily="34" charset="0"/>
+              </a:rPr>
+              <a:t>Contexto</a:t>
+            </a:r>
+          </a:p>
+        </p:txBody>
+      </p:sp>
+      <p:pic>
+        <p:nvPicPr>
+          <p:cNvPr id="6" name="Imagem 5"/>
+          <p:cNvPicPr>
+            <a:picLocks noChangeAspect="1"/>
+          </p:cNvPicPr>
+          <p:nvPr/>
+        </p:nvPicPr>
+        <p:blipFill>
+          <a:blip r:embed="rId2">
+            <a:extLst>
+              <a:ext uri="{28A0092B-C50C-407E-A947-70E740481C1C}">
+                <a14:useLocalDpi xmlns:a14="http://schemas.microsoft.com/office/drawing/2010/main" val="0"/>
+              </a:ext>
+            </a:extLst>
+          </a:blip>
+          <a:stretch>
+            <a:fillRect/>
+          </a:stretch>
+        </p:blipFill>
+        <p:spPr>
+          <a:xfrm>
+            <a:off x="2077851" y="1264573"/>
+            <a:ext cx="7758217" cy="5172144"/>
+          </a:xfrm>
+          <a:prstGeom prst="rect">
+            <a:avLst/>
+          </a:prstGeom>
+        </p:spPr>
+      </p:pic>
+    </p:spTree>
+    <p:extLst>
+      <p:ext uri="{BB962C8B-B14F-4D97-AF65-F5344CB8AC3E}">
+        <p14:creationId xmlns:p14="http://schemas.microsoft.com/office/powerpoint/2010/main" val="246697480"/>
+      </p:ext>
+    </p:extLst>
+  </p:cSld>
+  <p:clrMapOvr>
+    <a:masterClrMapping/>
+  </p:clrMapOvr>
+  <p:timing>
+    <p:tnLst>
+      <p:par>
+        <p:cTn id="1" dur="indefinite" restart="never" nodeType="tmRoot"/>
+      </p:par>
+    </p:tnLst>
+  </p:timing>
+</p:sld>
+</file>
+
+<file path=ppt/slides/slide4.xml><?xml version="1.0" encoding="utf-8"?>
+<p:sld xmlns:a="http://schemas.openxmlformats.org/drawingml/2006/main" xmlns:r="http://schemas.openxmlformats.org/officeDocument/2006/relationships" xmlns:p="http://schemas.openxmlformats.org/presentationml/2006/main">
+  <p:cSld>
+    <p:spTree>
+      <p:nvGrpSpPr>
+        <p:cNvPr id="1" name=""/>
+        <p:cNvGrpSpPr/>
+        <p:nvPr/>
+      </p:nvGrpSpPr>
+      <p:grpSpPr>
+        <a:xfrm>
+          <a:off x="0" y="0"/>
+          <a:ext cx="0" cy="0"/>
+          <a:chOff x="0" y="0"/>
+          <a:chExt cx="0" cy="0"/>
+        </a:xfrm>
+      </p:grpSpPr>
+      <p:sp>
+        <p:nvSpPr>
+          <p:cNvPr id="5" name="Título 1">
+            <a:extLst>
+              <a:ext uri="{FF2B5EF4-FFF2-40B4-BE49-F238E27FC236}">
+                <a16:creationId xmlns:a16="http://schemas.microsoft.com/office/drawing/2014/main" id="{8A0AA669-0469-465D-815F-87FEEED0039A}"/>
+              </a:ext>
+            </a:extLst>
+          </p:cNvPr>
+          <p:cNvSpPr txBox="1">
+            <a:spLocks/>
+          </p:cNvSpPr>
+          <p:nvPr/>
+        </p:nvSpPr>
+        <p:spPr>
+          <a:xfrm>
+            <a:off x="3560618" y="393715"/>
+            <a:ext cx="5070764" cy="609601"/>
+          </a:xfrm>
+          <a:prstGeom prst="rect">
+            <a:avLst/>
+          </a:prstGeom>
+          <a:noFill/>
+          <a:ln w="57150">
+            <a:solidFill>
+              <a:srgbClr val="E57019"/>
+            </a:solidFill>
+            <a:prstDash val="lgDash"/>
+          </a:ln>
+        </p:spPr>
+        <p:txBody>
+          <a:bodyPr vert="horz" lIns="91440" tIns="45720" rIns="91440" bIns="45720" rtlCol="0" anchor="ctr">
+            <a:normAutofit fontScale="97500"/>
+          </a:bodyPr>
+          <a:lstStyle>
+            <a:lvl1pPr algn="l" defTabSz="914400" rtl="0" eaLnBrk="1" latinLnBrk="0" hangingPunct="1">
+              <a:lnSpc>
+                <a:spcPct val="90000"/>
+              </a:lnSpc>
+              <a:spcBef>
+                <a:spcPct val="0"/>
+              </a:spcBef>
+              <a:buNone/>
+              <a:defRPr sz="4400" kern="1200">
+                <a:solidFill>
+                  <a:schemeClr val="tx1"/>
+                </a:solidFill>
+                <a:latin typeface="+mj-lt"/>
+                <a:ea typeface="+mj-ea"/>
+                <a:cs typeface="+mj-cs"/>
+              </a:defRPr>
+            </a:lvl1pPr>
+          </a:lstStyle>
+          <a:p>
+            <a:pPr algn="ctr"/>
+            <a:r>
+              <a:rPr lang="pt-BR" sz="2400" dirty="0">
+                <a:latin typeface="Bahnschrift" panose="020B0502040204020203" pitchFamily="34" charset="0"/>
+              </a:rPr>
+              <a:t>Contexto</a:t>
+            </a:r>
+          </a:p>
+        </p:txBody>
+      </p:sp>
+      <p:sp>
+        <p:nvSpPr>
+          <p:cNvPr id="2" name="CaixaDeTexto 1"/>
+          <p:cNvSpPr txBox="1"/>
+          <p:nvPr/>
+        </p:nvSpPr>
+        <p:spPr>
+          <a:xfrm>
+            <a:off x="795647" y="1828800"/>
+            <a:ext cx="4966524" cy="923330"/>
+          </a:xfrm>
+          <a:prstGeom prst="rect">
+            <a:avLst/>
+          </a:prstGeom>
+          <a:noFill/>
+        </p:spPr>
+        <p:txBody>
+          <a:bodyPr wrap="square" rtlCol="0">
+            <a:spAutoFit/>
+          </a:bodyPr>
+          <a:lstStyle/>
+          <a:p>
+            <a:pPr marL="285750" indent="-285750">
+              <a:buFont typeface="Arial" panose="020B0604020202020204" pitchFamily="34" charset="0"/>
+              <a:buChar char="•"/>
+            </a:pPr>
+            <a:r>
+              <a:rPr lang="pt-BR" dirty="0" smtClean="0"/>
+              <a:t>Como funciona transporte público no Brasil?</a:t>
+            </a:r>
+          </a:p>
+          <a:p>
+            <a:pPr marL="285750" indent="-285750">
+              <a:buFont typeface="Arial" panose="020B0604020202020204" pitchFamily="34" charset="0"/>
+              <a:buChar char="•"/>
+            </a:pPr>
+            <a:endParaRPr lang="pt-BR" dirty="0" smtClean="0"/>
+          </a:p>
+          <a:p>
+            <a:pPr marL="285750" indent="-285750">
+              <a:buFont typeface="Arial" panose="020B0604020202020204" pitchFamily="34" charset="0"/>
+              <a:buChar char="•"/>
+            </a:pPr>
+            <a:endParaRPr lang="pt-BR" dirty="0" smtClean="0"/>
+          </a:p>
+        </p:txBody>
+      </p:sp>
+      <p:sp>
+        <p:nvSpPr>
+          <p:cNvPr id="3" name="CaixaDeTexto 2"/>
+          <p:cNvSpPr txBox="1"/>
+          <p:nvPr/>
+        </p:nvSpPr>
+        <p:spPr>
+          <a:xfrm>
+            <a:off x="6325589" y="3309257"/>
+            <a:ext cx="4197268" cy="646331"/>
+          </a:xfrm>
+          <a:prstGeom prst="rect">
+            <a:avLst/>
+          </a:prstGeom>
+          <a:noFill/>
+        </p:spPr>
+        <p:txBody>
+          <a:bodyPr wrap="square" rtlCol="0">
+            <a:spAutoFit/>
+          </a:bodyPr>
+          <a:lstStyle/>
+          <a:p>
+            <a:pPr marL="285750" indent="-285750">
+              <a:buFont typeface="Arial" panose="020B0604020202020204" pitchFamily="34" charset="0"/>
+              <a:buChar char="•"/>
+            </a:pPr>
+            <a:r>
+              <a:rPr lang="pt-BR"/>
+              <a:t>Como a gente resolve os problemas estes problemas?</a:t>
+            </a:r>
+            <a:endParaRPr lang="pt-BR" dirty="0"/>
+          </a:p>
+        </p:txBody>
+      </p:sp>
+      <p:sp>
+        <p:nvSpPr>
+          <p:cNvPr id="4" name="CaixaDeTexto 3"/>
+          <p:cNvSpPr txBox="1"/>
+          <p:nvPr/>
+        </p:nvSpPr>
+        <p:spPr>
+          <a:xfrm>
+            <a:off x="1175658" y="5268686"/>
+            <a:ext cx="3829895" cy="646331"/>
+          </a:xfrm>
+          <a:prstGeom prst="rect">
+            <a:avLst/>
+          </a:prstGeom>
+          <a:noFill/>
+        </p:spPr>
+        <p:txBody>
+          <a:bodyPr wrap="none" rtlCol="0">
+            <a:spAutoFit/>
+          </a:bodyPr>
+          <a:lstStyle/>
+          <a:p>
+            <a:pPr marL="285750" indent="-285750">
+              <a:buFont typeface="Arial" panose="020B0604020202020204" pitchFamily="34" charset="0"/>
+              <a:buChar char="•"/>
+            </a:pPr>
+            <a:r>
+              <a:rPr lang="pt-BR" dirty="0"/>
+              <a:t>Como funciona o sensor no ônibus?</a:t>
+            </a:r>
+          </a:p>
+          <a:p>
+            <a:endParaRPr lang="pt-BR" dirty="0"/>
+          </a:p>
+        </p:txBody>
+      </p:sp>
+    </p:spTree>
+    <p:extLst>
+      <p:ext uri="{BB962C8B-B14F-4D97-AF65-F5344CB8AC3E}">
+        <p14:creationId xmlns:p14="http://schemas.microsoft.com/office/powerpoint/2010/main" val="3567727220"/>
+      </p:ext>
+    </p:extLst>
+  </p:cSld>
+  <p:clrMapOvr>
+    <a:masterClrMapping/>
+  </p:clrMapOvr>
+  <p:timing>
+    <p:tnLst>
+      <p:par>
+        <p:cTn id="1" dur="indefinite" restart="never" nodeType="tmRoot"/>
+      </p:par>
+    </p:tnLst>
+  </p:timing>
+</p:sld>
+</file>
+
+<file path=ppt/slides/slide5.xml><?xml version="1.0" encoding="utf-8"?>
+<p:sld xmlns:a="http://schemas.openxmlformats.org/drawingml/2006/main" xmlns:r="http://schemas.openxmlformats.org/officeDocument/2006/relationships" xmlns:p="http://schemas.openxmlformats.org/presentationml/2006/main">
+  <p:cSld>
+    <p:bg>
+      <p:bgPr>
+        <a:solidFill>
+          <a:srgbClr val="FFFFFF"/>
+        </a:solidFill>
+        <a:effectLst/>
+      </p:bgPr>
+    </p:bg>
     <p:spTree>
       <p:nvGrpSpPr>
         <p:cNvPr id="1" name=""/>
@@ -4803,7 +5901,7 @@
           <p:nvPr/>
         </p:nvPicPr>
         <p:blipFill>
-          <a:blip r:embed="rId6" cstate="print">
+          <a:blip r:embed="rId6" cstate="hqprint">
             <a:extLst>
               <a:ext uri="{28A0092B-C50C-407E-A947-70E740481C1C}">
                 <a14:useLocalDpi xmlns:a14="http://schemas.microsoft.com/office/drawing/2010/main" val="0"/>
@@ -5525,12 +6623,27 @@
   <p:clrMapOvr>
     <a:masterClrMapping/>
   </p:clrMapOvr>
+  <p:timing>
+    <p:tnLst>
+      <p:par>
+        <p:cTn id="1" dur="indefinite" restart="never" nodeType="tmRoot"/>
+      </p:par>
+    </p:tnLst>
+  </p:timing>
 </p:sld>
 </file>
 
-<file path=ppt/slides/slide4.xml><?xml version="1.0" encoding="utf-8"?>
+<file path=ppt/slides/slide6.xml><?xml version="1.0" encoding="utf-8"?>
 <p:sld xmlns:a="http://schemas.openxmlformats.org/drawingml/2006/main" xmlns:r="http://schemas.openxmlformats.org/officeDocument/2006/relationships" xmlns:p="http://schemas.openxmlformats.org/presentationml/2006/main">
   <p:cSld>
+    <p:bg>
+      <p:bgPr>
+        <a:solidFill>
+          <a:srgbClr val="FFFFFF"/>
+        </a:solidFill>
+        <a:effectLst/>
+      </p:bgPr>
+    </p:bg>
     <p:spTree>
       <p:nvGrpSpPr>
         <p:cNvPr id="1" name=""/>
@@ -6555,12 +7668,27 @@
   <p:clrMapOvr>
     <a:masterClrMapping/>
   </p:clrMapOvr>
+  <p:timing>
+    <p:tnLst>
+      <p:par>
+        <p:cTn id="1" dur="indefinite" restart="never" nodeType="tmRoot"/>
+      </p:par>
+    </p:tnLst>
+  </p:timing>
 </p:sld>
 </file>
 
-<file path=ppt/slides/slide5.xml><?xml version="1.0" encoding="utf-8"?>
+<file path=ppt/slides/slide7.xml><?xml version="1.0" encoding="utf-8"?>
 <p:sld xmlns:a="http://schemas.openxmlformats.org/drawingml/2006/main" xmlns:r="http://schemas.openxmlformats.org/officeDocument/2006/relationships" xmlns:p="http://schemas.openxmlformats.org/presentationml/2006/main">
   <p:cSld>
+    <p:bg>
+      <p:bgPr>
+        <a:solidFill>
+          <a:srgbClr val="FFFFFF"/>
+        </a:solidFill>
+        <a:effectLst/>
+      </p:bgPr>
+    </p:bg>
     <p:spTree>
       <p:nvGrpSpPr>
         <p:cNvPr id="1" name=""/>
@@ -6813,10 +7941,17 @@
   <p:clrMapOvr>
     <a:masterClrMapping/>
   </p:clrMapOvr>
+  <p:timing>
+    <p:tnLst>
+      <p:par>
+        <p:cTn id="1" dur="indefinite" restart="never" nodeType="tmRoot"/>
+      </p:par>
+    </p:tnLst>
+  </p:timing>
 </p:sld>
 </file>
 
-<file path=ppt/slides/slide6.xml><?xml version="1.0" encoding="utf-8"?>
+<file path=ppt/slides/slide8.xml><?xml version="1.0" encoding="utf-8"?>
 <p:sld xmlns:a="http://schemas.openxmlformats.org/drawingml/2006/main" xmlns:r="http://schemas.openxmlformats.org/officeDocument/2006/relationships" xmlns:p="http://schemas.openxmlformats.org/presentationml/2006/main">
   <p:cSld>
     <p:spTree>
@@ -6933,7 +8068,7 @@
             <p:nvPr/>
           </p:nvPicPr>
           <p:blipFill>
-            <a:blip r:embed="rId3">
+            <a:blip r:embed="rId3" cstate="hqprint">
               <a:extLst>
                 <a:ext uri="{28A0092B-C50C-407E-A947-70E740481C1C}">
                   <a14:useLocalDpi xmlns:a14="http://schemas.microsoft.com/office/drawing/2010/main" val="0"/>
@@ -7132,12 +8267,27 @@
   <p:clrMapOvr>
     <a:masterClrMapping/>
   </p:clrMapOvr>
+  <p:timing>
+    <p:tnLst>
+      <p:par>
+        <p:cTn id="1" dur="indefinite" restart="never" nodeType="tmRoot"/>
+      </p:par>
+    </p:tnLst>
+  </p:timing>
 </p:sld>
 </file>
 
-<file path=ppt/slides/slide7.xml><?xml version="1.0" encoding="utf-8"?>
+<file path=ppt/slides/slide9.xml><?xml version="1.0" encoding="utf-8"?>
 <p:sld xmlns:a="http://schemas.openxmlformats.org/drawingml/2006/main" xmlns:r="http://schemas.openxmlformats.org/officeDocument/2006/relationships" xmlns:p="http://schemas.openxmlformats.org/presentationml/2006/main">
   <p:cSld>
+    <p:bg>
+      <p:bgPr>
+        <a:solidFill>
+          <a:srgbClr val="FFFFFF"/>
+        </a:solidFill>
+        <a:effectLst/>
+      </p:bgPr>
+    </p:bg>
     <p:spTree>
       <p:nvGrpSpPr>
         <p:cNvPr id="1" name=""/>
@@ -25135,420 +26285,13 @@
   <p:clrMapOvr>
     <a:masterClrMapping/>
   </p:clrMapOvr>
-</p:sld>
-</file>
-
-<file path=ppt/slides/slide8.xml><?xml version="1.0" encoding="utf-8"?>
-<p:sld xmlns:a="http://schemas.openxmlformats.org/drawingml/2006/main" xmlns:r="http://schemas.openxmlformats.org/officeDocument/2006/relationships" xmlns:p="http://schemas.openxmlformats.org/presentationml/2006/main">
-  <p:cSld>
-    <p:spTree>
-      <p:nvGrpSpPr>
-        <p:cNvPr id="1" name=""/>
-        <p:cNvGrpSpPr/>
-        <p:nvPr/>
-      </p:nvGrpSpPr>
-      <p:grpSpPr>
-        <a:xfrm>
-          <a:off x="0" y="0"/>
-          <a:ext cx="0" cy="0"/>
-          <a:chOff x="0" y="0"/>
-          <a:chExt cx="0" cy="0"/>
-        </a:xfrm>
-      </p:grpSpPr>
-      <p:sp>
-        <p:nvSpPr>
-          <p:cNvPr id="5" name="Título 1">
-            <a:extLst>
-              <a:ext uri="{FF2B5EF4-FFF2-40B4-BE49-F238E27FC236}">
-                <a16:creationId xmlns:a16="http://schemas.microsoft.com/office/drawing/2014/main" id="{8A0AA669-0469-465D-815F-87FEEED0039A}"/>
-              </a:ext>
-            </a:extLst>
-          </p:cNvPr>
-          <p:cNvSpPr txBox="1">
-            <a:spLocks/>
-          </p:cNvSpPr>
-          <p:nvPr/>
-        </p:nvSpPr>
-        <p:spPr>
-          <a:xfrm>
-            <a:off x="3304309" y="302230"/>
-            <a:ext cx="5839692" cy="609601"/>
-          </a:xfrm>
-          <a:prstGeom prst="rect">
-            <a:avLst/>
-          </a:prstGeom>
-          <a:noFill/>
-          <a:ln w="57150">
-            <a:solidFill>
-              <a:srgbClr val="E57019"/>
-            </a:solidFill>
-            <a:prstDash val="lgDash"/>
-          </a:ln>
-        </p:spPr>
-        <p:txBody>
-          <a:bodyPr vert="horz" lIns="91440" tIns="45720" rIns="91440" bIns="45720" rtlCol="0" anchor="ctr">
-            <a:normAutofit fontScale="97500"/>
-          </a:bodyPr>
-          <a:lstStyle>
-            <a:lvl1pPr algn="l" defTabSz="914400" rtl="0" eaLnBrk="1" latinLnBrk="0" hangingPunct="1">
-              <a:lnSpc>
-                <a:spcPct val="90000"/>
-              </a:lnSpc>
-              <a:spcBef>
-                <a:spcPct val="0"/>
-              </a:spcBef>
-              <a:buNone/>
-              <a:defRPr sz="4400" kern="1200">
-                <a:solidFill>
-                  <a:schemeClr val="tx1"/>
-                </a:solidFill>
-                <a:latin typeface="+mj-lt"/>
-                <a:ea typeface="+mj-ea"/>
-                <a:cs typeface="+mj-cs"/>
-              </a:defRPr>
-            </a:lvl1pPr>
-          </a:lstStyle>
-          <a:p>
-            <a:pPr algn="ctr"/>
-            <a:r>
-              <a:rPr lang="pt-BR" sz="2400" dirty="0">
-                <a:latin typeface="Bahnschrift" panose="020B0502040204020203" pitchFamily="34" charset="0"/>
-              </a:rPr>
-              <a:t>Demonstração do Simulador de Sensores</a:t>
-            </a:r>
-          </a:p>
-        </p:txBody>
-      </p:sp>
-      <p:pic>
-        <p:nvPicPr>
-          <p:cNvPr id="4" name="Imagem 3">
-            <a:extLst>
-              <a:ext uri="{FF2B5EF4-FFF2-40B4-BE49-F238E27FC236}">
-                <a16:creationId xmlns:a16="http://schemas.microsoft.com/office/drawing/2014/main" id="{8810BCA7-9A63-408C-A773-F731EE6F2E5A}"/>
-              </a:ext>
-            </a:extLst>
-          </p:cNvPr>
-          <p:cNvPicPr>
-            <a:picLocks noChangeAspect="1"/>
-          </p:cNvPicPr>
-          <p:nvPr/>
-        </p:nvPicPr>
-        <p:blipFill>
-          <a:blip r:embed="rId2">
-            <a:extLst>
-              <a:ext uri="{BEBA8EAE-BF5A-486C-A8C5-ECC9F3942E4B}">
-                <a14:imgProps xmlns:a14="http://schemas.microsoft.com/office/drawing/2010/main">
-                  <a14:imgLayer r:embed="rId3">
-                    <a14:imgEffect>
-                      <a14:backgroundRemoval t="10000" b="90000" l="10000" r="90000">
-                        <a14:foregroundMark x1="59434" y1="82390" x2="59434" y2="82390"/>
-                        <a14:foregroundMark x1="65409" y1="75472" x2="65409" y2="75472"/>
-                        <a14:foregroundMark x1="79245" y1="77358" x2="79245" y2="77358"/>
-                        <a14:foregroundMark x1="61006" y1="34591" x2="61006" y2="34591"/>
-                        <a14:foregroundMark x1="38050" y1="35220" x2="38050" y2="35220"/>
-                        <a14:foregroundMark x1="47170" y1="73585" x2="47170" y2="73585"/>
-                        <a14:foregroundMark x1="44340" y1="77358" x2="44340" y2="77358"/>
-                        <a14:foregroundMark x1="32704" y1="77358" x2="32704" y2="77358"/>
-                        <a14:foregroundMark x1="26101" y1="80503" x2="26101" y2="80503"/>
-                      </a14:backgroundRemoval>
-                    </a14:imgEffect>
-                    <a14:imgEffect>
-                      <a14:sharpenSoften amount="25000"/>
-                    </a14:imgEffect>
-                  </a14:imgLayer>
-                </a14:imgProps>
-              </a:ext>
-              <a:ext uri="{28A0092B-C50C-407E-A947-70E740481C1C}">
-                <a14:useLocalDpi xmlns:a14="http://schemas.microsoft.com/office/drawing/2010/main" val="0"/>
-              </a:ext>
-            </a:extLst>
-          </a:blip>
-          <a:stretch>
-            <a:fillRect/>
-          </a:stretch>
-        </p:blipFill>
-        <p:spPr>
-          <a:xfrm>
-            <a:off x="619124" y="2391796"/>
-            <a:ext cx="4148816" cy="2074408"/>
-          </a:xfrm>
-          <a:prstGeom prst="rect">
-            <a:avLst/>
-          </a:prstGeom>
-        </p:spPr>
-      </p:pic>
-      <p:pic>
-        <p:nvPicPr>
-          <p:cNvPr id="1028" name="Picture 4" descr="Node.js - O que é, como funciona e quais as vantagens | OPUS">
-            <a:extLst>
-              <a:ext uri="{FF2B5EF4-FFF2-40B4-BE49-F238E27FC236}">
-                <a16:creationId xmlns:a16="http://schemas.microsoft.com/office/drawing/2014/main" id="{F7EF85FB-FC46-4D91-9A0B-52EFC04A42AE}"/>
-              </a:ext>
-            </a:extLst>
-          </p:cNvPr>
-          <p:cNvPicPr>
-            <a:picLocks noChangeAspect="1" noChangeArrowheads="1"/>
-          </p:cNvPicPr>
-          <p:nvPr/>
-        </p:nvPicPr>
-        <p:blipFill>
-          <a:blip r:embed="rId4">
-            <a:extLst>
-              <a:ext uri="{BEBA8EAE-BF5A-486C-A8C5-ECC9F3942E4B}">
-                <a14:imgProps xmlns:a14="http://schemas.microsoft.com/office/drawing/2010/main">
-                  <a14:imgLayer r:embed="rId5">
-                    <a14:imgEffect>
-                      <a14:backgroundRemoval t="10000" b="90000" l="10000" r="90000">
-                        <a14:foregroundMark x1="20700" y1="35667" x2="20700" y2="35667"/>
-                        <a14:foregroundMark x1="33200" y1="38500" x2="33200" y2="38500"/>
-                        <a14:foregroundMark x1="37700" y1="43000" x2="37700" y2="43000"/>
-                        <a14:foregroundMark x1="40700" y1="42500" x2="40700" y2="42500"/>
-                        <a14:foregroundMark x1="40700" y1="42500" x2="40700" y2="42500"/>
-                        <a14:foregroundMark x1="40400" y1="42000" x2="40400" y2="42000"/>
-                        <a14:foregroundMark x1="42700" y1="51000" x2="42700" y2="51000"/>
-                        <a14:foregroundMark x1="42700" y1="51000" x2="42700" y2="51000"/>
-                        <a14:foregroundMark x1="47100" y1="47667" x2="47100" y2="47667"/>
-                        <a14:foregroundMark x1="47100" y1="47000" x2="47100" y2="47000"/>
-                        <a14:foregroundMark x1="33900" y1="54333" x2="33900" y2="54333"/>
-                        <a14:foregroundMark x1="33900" y1="54333" x2="33900" y2="54333"/>
-                        <a14:foregroundMark x1="66500" y1="33500" x2="66500" y2="33500"/>
-                        <a14:foregroundMark x1="66500" y1="36333" x2="66500" y2="36333"/>
-                        <a14:foregroundMark x1="67100" y1="42000" x2="67100" y2="42000"/>
-                        <a14:foregroundMark x1="67100" y1="42500" x2="67100" y2="42500"/>
-                        <a14:foregroundMark x1="67100" y1="40833" x2="67100" y2="40833"/>
-                        <a14:foregroundMark x1="67100" y1="40833" x2="67100" y2="40833"/>
-                        <a14:foregroundMark x1="66800" y1="40333" x2="66800" y2="40333"/>
-                        <a14:foregroundMark x1="75300" y1="45333" x2="75300" y2="45333"/>
-                        <a14:foregroundMark x1="75300" y1="45333" x2="75300" y2="45333"/>
-                        <a14:foregroundMark x1="81000" y1="44167" x2="81000" y2="44167"/>
-                        <a14:foregroundMark x1="54400" y1="63333" x2="54400" y2="63333"/>
-                        <a14:foregroundMark x1="50400" y1="69500" x2="50400" y2="69500"/>
-                      </a14:backgroundRemoval>
-                    </a14:imgEffect>
-                  </a14:imgLayer>
-                </a14:imgProps>
-              </a:ext>
-              <a:ext uri="{28A0092B-C50C-407E-A947-70E740481C1C}">
-                <a14:useLocalDpi xmlns:a14="http://schemas.microsoft.com/office/drawing/2010/main" val="0"/>
-              </a:ext>
-            </a:extLst>
-          </a:blip>
-          <a:srcRect/>
-          <a:stretch>
-            <a:fillRect/>
-          </a:stretch>
-        </p:blipFill>
-        <p:spPr bwMode="auto">
-          <a:xfrm>
-            <a:off x="6585857" y="2283641"/>
-            <a:ext cx="4283529" cy="2570117"/>
-          </a:xfrm>
-          <a:prstGeom prst="rect">
-            <a:avLst/>
-          </a:prstGeom>
-          <a:noFill/>
-          <a:extLst>
-            <a:ext uri="{909E8E84-426E-40DD-AFC4-6F175D3DCCD1}">
-              <a14:hiddenFill xmlns:a14="http://schemas.microsoft.com/office/drawing/2010/main">
-                <a:solidFill>
-                  <a:srgbClr val="FFFFFF"/>
-                </a:solidFill>
-              </a14:hiddenFill>
-            </a:ext>
-          </a:extLst>
-        </p:spPr>
-      </p:pic>
-    </p:spTree>
-    <p:extLst>
-      <p:ext uri="{BB962C8B-B14F-4D97-AF65-F5344CB8AC3E}">
-        <p14:creationId xmlns:p14="http://schemas.microsoft.com/office/powerpoint/2010/main" val="3792423416"/>
-      </p:ext>
-    </p:extLst>
-  </p:cSld>
-  <p:clrMapOvr>
-    <a:masterClrMapping/>
-  </p:clrMapOvr>
-</p:sld>
-</file>
-
-<file path=ppt/slides/slide9.xml><?xml version="1.0" encoding="utf-8"?>
-<p:sld xmlns:a="http://schemas.openxmlformats.org/drawingml/2006/main" xmlns:r="http://schemas.openxmlformats.org/officeDocument/2006/relationships" xmlns:p="http://schemas.openxmlformats.org/presentationml/2006/main">
-  <p:cSld>
-    <p:spTree>
-      <p:nvGrpSpPr>
-        <p:cNvPr id="1" name=""/>
-        <p:cNvGrpSpPr/>
-        <p:nvPr/>
-      </p:nvGrpSpPr>
-      <p:grpSpPr>
-        <a:xfrm>
-          <a:off x="0" y="0"/>
-          <a:ext cx="0" cy="0"/>
-          <a:chOff x="0" y="0"/>
-          <a:chExt cx="0" cy="0"/>
-        </a:xfrm>
-      </p:grpSpPr>
-      <p:sp>
-        <p:nvSpPr>
-          <p:cNvPr id="5" name="Título 1">
-            <a:extLst>
-              <a:ext uri="{FF2B5EF4-FFF2-40B4-BE49-F238E27FC236}">
-                <a16:creationId xmlns:a16="http://schemas.microsoft.com/office/drawing/2014/main" id="{8A0AA669-0469-465D-815F-87FEEED0039A}"/>
-              </a:ext>
-            </a:extLst>
-          </p:cNvPr>
-          <p:cNvSpPr txBox="1">
-            <a:spLocks/>
-          </p:cNvSpPr>
-          <p:nvPr/>
-        </p:nvSpPr>
-        <p:spPr>
-          <a:xfrm>
-            <a:off x="3560618" y="178405"/>
-            <a:ext cx="5070764" cy="609601"/>
-          </a:xfrm>
-          <a:prstGeom prst="rect">
-            <a:avLst/>
-          </a:prstGeom>
-          <a:noFill/>
-          <a:ln w="57150">
-            <a:solidFill>
-              <a:srgbClr val="E57019"/>
-            </a:solidFill>
-            <a:prstDash val="lgDash"/>
-          </a:ln>
-        </p:spPr>
-        <p:txBody>
-          <a:bodyPr vert="horz" lIns="91440" tIns="45720" rIns="91440" bIns="45720" rtlCol="0" anchor="ctr">
-            <a:normAutofit fontScale="97500"/>
-          </a:bodyPr>
-          <a:lstStyle>
-            <a:lvl1pPr algn="l" defTabSz="914400" rtl="0" eaLnBrk="1" latinLnBrk="0" hangingPunct="1">
-              <a:lnSpc>
-                <a:spcPct val="90000"/>
-              </a:lnSpc>
-              <a:spcBef>
-                <a:spcPct val="0"/>
-              </a:spcBef>
-              <a:buNone/>
-              <a:defRPr sz="4400" kern="1200">
-                <a:solidFill>
-                  <a:schemeClr val="tx1"/>
-                </a:solidFill>
-                <a:latin typeface="+mj-lt"/>
-                <a:ea typeface="+mj-ea"/>
-                <a:cs typeface="+mj-cs"/>
-              </a:defRPr>
-            </a:lvl1pPr>
-          </a:lstStyle>
-          <a:p>
-            <a:pPr algn="ctr"/>
-            <a:r>
-              <a:rPr lang="pt-BR" sz="2400" dirty="0">
-                <a:latin typeface="Bahnschrift" panose="020B0502040204020203" pitchFamily="34" charset="0"/>
-              </a:rPr>
-              <a:t>Tabelas / Modelo de dados Lógico</a:t>
-            </a:r>
-          </a:p>
-        </p:txBody>
-      </p:sp>
-      <p:pic>
-        <p:nvPicPr>
-          <p:cNvPr id="3" name="Imagem 2">
-            <a:extLst>
-              <a:ext uri="{FF2B5EF4-FFF2-40B4-BE49-F238E27FC236}">
-                <a16:creationId xmlns:a16="http://schemas.microsoft.com/office/drawing/2014/main" id="{453D1DE1-5E6A-4701-815A-F9B48AA49864}"/>
-              </a:ext>
-            </a:extLst>
-          </p:cNvPr>
-          <p:cNvPicPr>
-            <a:picLocks noChangeAspect="1"/>
-          </p:cNvPicPr>
-          <p:nvPr/>
-        </p:nvPicPr>
-        <p:blipFill>
-          <a:blip r:embed="rId2"/>
-          <a:stretch>
-            <a:fillRect/>
-          </a:stretch>
-        </p:blipFill>
-        <p:spPr>
-          <a:xfrm>
-            <a:off x="581025" y="1051225"/>
-            <a:ext cx="6648450" cy="5362575"/>
-          </a:xfrm>
-          <a:prstGeom prst="rect">
-            <a:avLst/>
-          </a:prstGeom>
-          <a:ln>
-            <a:noFill/>
-          </a:ln>
-          <a:effectLst>
-            <a:outerShdw blurRad="292100" dist="139700" dir="2700000" algn="tl" rotWithShape="0">
-              <a:srgbClr val="333333">
-                <a:alpha val="65000"/>
-              </a:srgbClr>
-            </a:outerShdw>
-          </a:effectLst>
-        </p:spPr>
-      </p:pic>
-      <p:pic>
-        <p:nvPicPr>
-          <p:cNvPr id="2050" name="Picture 2" descr="MySQL 8: as melhorias da nova versão do MySQL | Homehost">
-            <a:extLst>
-              <a:ext uri="{FF2B5EF4-FFF2-40B4-BE49-F238E27FC236}">
-                <a16:creationId xmlns:a16="http://schemas.microsoft.com/office/drawing/2014/main" id="{4AA54AEF-3C3E-457C-9C7D-5EDD55675372}"/>
-              </a:ext>
-            </a:extLst>
-          </p:cNvPr>
-          <p:cNvPicPr>
-            <a:picLocks noChangeAspect="1" noChangeArrowheads="1"/>
-          </p:cNvPicPr>
-          <p:nvPr/>
-        </p:nvPicPr>
-        <p:blipFill>
-          <a:blip r:embed="rId3">
-            <a:extLst>
-              <a:ext uri="{28A0092B-C50C-407E-A947-70E740481C1C}">
-                <a14:useLocalDpi xmlns:a14="http://schemas.microsoft.com/office/drawing/2010/main" val="0"/>
-              </a:ext>
-            </a:extLst>
-          </a:blip>
-          <a:srcRect/>
-          <a:stretch>
-            <a:fillRect/>
-          </a:stretch>
-        </p:blipFill>
-        <p:spPr bwMode="auto">
-          <a:xfrm>
-            <a:off x="8029575" y="2561629"/>
-            <a:ext cx="3257140" cy="1361383"/>
-          </a:xfrm>
-          <a:prstGeom prst="rect">
-            <a:avLst/>
-          </a:prstGeom>
-          <a:noFill/>
-          <a:extLst>
-            <a:ext uri="{909E8E84-426E-40DD-AFC4-6F175D3DCCD1}">
-              <a14:hiddenFill xmlns:a14="http://schemas.microsoft.com/office/drawing/2010/main">
-                <a:solidFill>
-                  <a:srgbClr val="FFFFFF"/>
-                </a:solidFill>
-              </a14:hiddenFill>
-            </a:ext>
-          </a:extLst>
-        </p:spPr>
-      </p:pic>
-    </p:spTree>
-    <p:extLst>
-      <p:ext uri="{BB962C8B-B14F-4D97-AF65-F5344CB8AC3E}">
-        <p14:creationId xmlns:p14="http://schemas.microsoft.com/office/powerpoint/2010/main" val="1542098227"/>
-      </p:ext>
-    </p:extLst>
-  </p:cSld>
-  <p:clrMapOvr>
-    <a:masterClrMapping/>
-  </p:clrMapOvr>
+  <p:timing>
+    <p:tnLst>
+      <p:par>
+        <p:cTn id="1" dur="indefinite" restart="never" nodeType="tmRoot"/>
+      </p:par>
+    </p:tnLst>
+  </p:timing>
 </p:sld>
 </file>
 

</xml_diff>

<commit_message>
Slide e Ordem de Apresentação
</commit_message>
<xml_diff>
--- a/Apresentação/Sprint 2.pptx
+++ b/Apresentação/Sprint 2.pptx
@@ -128,7 +128,7 @@
             <p14:sldId id="256"/>
           </p14:sldIdLst>
         </p14:section>
-        <p14:section name="Contexto" id="{E65FBA31-81D2-4A20-9DA3-6E2057ECFAAC}">
+        <p14:section name=" Contexto - Diego" id="{E65FBA31-81D2-4A20-9DA3-6E2057ECFAAC}">
           <p14:sldIdLst>
             <p14:sldId id="257"/>
             <p14:sldId id="270"/>
@@ -136,22 +136,22 @@
             <p14:sldId id="271"/>
           </p14:sldIdLst>
         </p14:section>
-        <p14:section name="Diagrama Negócio" id="{930E1065-A16D-4B77-8A2B-8E59C376A5E4}">
+        <p14:section name="Diagrama Negócio - Pedro" id="{930E1065-A16D-4B77-8A2B-8E59C376A5E4}">
           <p14:sldIdLst>
             <p14:sldId id="268"/>
           </p14:sldIdLst>
         </p14:section>
-        <p14:section name="Diagrama Técnico" id="{706520F1-C624-40EA-A79D-4CF83318F00D}">
+        <p14:section name="Diagrama Técnico - Matheus" id="{706520F1-C624-40EA-A79D-4CF83318F00D}">
           <p14:sldIdLst>
             <p14:sldId id="269"/>
           </p14:sldIdLst>
         </p14:section>
-        <p14:section name="Backlog/Trello" id="{71B52C51-62C8-47A7-AF93-119D5B0CD510}">
+        <p14:section name="Backlog/Trello - Diego" id="{71B52C51-62C8-47A7-AF93-119D5B0CD510}">
           <p14:sldIdLst>
             <p14:sldId id="259"/>
           </p14:sldIdLst>
         </p14:section>
-        <p14:section name="Site" id="{119BF0ED-0E3B-49C5-8A1E-AD74EBE21D1E}">
+        <p14:section name="Site - Matheus" id="{119BF0ED-0E3B-49C5-8A1E-AD74EBE21D1E}">
           <p14:sldIdLst>
             <p14:sldId id="260"/>
           </p14:sldIdLst>

</xml_diff>

<commit_message>
Sprint Slide 2 V2.1
</commit_message>
<xml_diff>
--- a/Apresentação/Sprint 2.pptx
+++ b/Apresentação/Sprint 2.pptx
@@ -23802,10 +23802,10 @@
       </p:sp>
       <p:pic>
         <p:nvPicPr>
-          <p:cNvPr id="6" name="Imagem 5">
+          <p:cNvPr id="3" name="Imagem 2">
             <a:extLst>
               <a:ext uri="{FF2B5EF4-FFF2-40B4-BE49-F238E27FC236}">
-                <a16:creationId xmlns:a16="http://schemas.microsoft.com/office/drawing/2014/main" id="{AD92042C-59A8-4A40-8768-3A2252557882}"/>
+                <a16:creationId xmlns:a16="http://schemas.microsoft.com/office/drawing/2014/main" id="{6CC65F2E-1D52-4C21-983D-7C1D4210ECC7}"/>
               </a:ext>
             </a:extLst>
           </p:cNvPr>
@@ -23816,13 +23816,13 @@
         </p:nvPicPr>
         <p:blipFill rotWithShape="1">
           <a:blip r:embed="rId3"/>
-          <a:srcRect t="11964"/>
+          <a:srcRect t="11905"/>
           <a:stretch/>
         </p:blipFill>
         <p:spPr>
           <a:xfrm>
-            <a:off x="1175159" y="1468874"/>
-            <a:ext cx="9841681" cy="4310844"/>
+            <a:off x="1175159" y="1512417"/>
+            <a:ext cx="9841681" cy="4292210"/>
           </a:xfrm>
           <a:prstGeom prst="rect">
             <a:avLst/>
@@ -23863,6 +23863,9 @@
                     <p:cTn id="3" fill="hold">
                       <p:stCondLst>
                         <p:cond delay="indefinite"/>
+                        <p:cond evt="onBegin" delay="0">
+                          <p:tn val="2"/>
+                        </p:cond>
                       </p:stCondLst>
                       <p:childTnLst>
                         <p:par>
@@ -23872,7 +23875,7 @@
                             </p:stCondLst>
                             <p:childTnLst>
                               <p:par>
-                                <p:cTn id="5" presetID="10" presetClass="entr" presetSubtype="0" fill="hold" nodeType="clickEffect">
+                                <p:cTn id="5" presetID="10" presetClass="entr" presetSubtype="0" fill="hold" nodeType="afterEffect">
                                   <p:stCondLst>
                                     <p:cond delay="0"/>
                                   </p:stCondLst>
@@ -23885,7 +23888,7 @@
                                           </p:stCondLst>
                                         </p:cTn>
                                         <p:tgtEl>
-                                          <p:spTgt spid="6"/>
+                                          <p:spTgt spid="3"/>
                                         </p:tgtEl>
                                         <p:attrNameLst>
                                           <p:attrName>style.visibility</p:attrName>
@@ -23899,7 +23902,7 @@
                                       <p:cBhvr>
                                         <p:cTn id="7" dur="500"/>
                                         <p:tgtEl>
-                                          <p:spTgt spid="6"/>
+                                          <p:spTgt spid="3"/>
                                         </p:tgtEl>
                                       </p:cBhvr>
                                     </p:animEffect>

</xml_diff>